<commit_message>
ppt updates and screenshot added
</commit_message>
<xml_diff>
--- a/PPT.pptx
+++ b/PPT.pptx
@@ -17,8 +17,9 @@
     <p:sldId id="276" r:id="rId11"/>
     <p:sldId id="264" r:id="rId12"/>
     <p:sldId id="272" r:id="rId13"/>
-    <p:sldId id="273" r:id="rId14"/>
-    <p:sldId id="265" r:id="rId15"/>
+    <p:sldId id="277" r:id="rId14"/>
+    <p:sldId id="273" r:id="rId15"/>
+    <p:sldId id="265" r:id="rId16"/>
   </p:sldIdLst>
   <p:sldSz cx="12192000" cy="6858000"/>
   <p:notesSz cx="6858000" cy="9144000"/>
@@ -134,6 +135,7 @@
             <p14:sldId id="276"/>
             <p14:sldId id="264"/>
             <p14:sldId id="272"/>
+            <p14:sldId id="277"/>
             <p14:sldId id="273"/>
             <p14:sldId id="265"/>
           </p14:sldIdLst>
@@ -3784,7 +3786,7 @@
           <a:p>
             <a:r>
               <a:rPr lang="en-IN" dirty="0"/>
-              <a:t>JIRA Dashboard </a:t>
+              <a:t>JIRA Backlog Dashboard </a:t>
             </a:r>
           </a:p>
         </p:txBody>
@@ -3840,6 +3842,105 @@
         <p:cNvPr id="1" name="">
           <a:extLst>
             <a:ext uri="{FF2B5EF4-FFF2-40B4-BE49-F238E27FC236}">
+              <a16:creationId xmlns:a16="http://schemas.microsoft.com/office/drawing/2014/main" id="{91F67216-5FA3-916F-D4FF-706598C2D633}"/>
+            </a:ext>
+          </a:extLst>
+        </p:cNvPr>
+        <p:cNvGrpSpPr/>
+        <p:nvPr/>
+      </p:nvGrpSpPr>
+      <p:grpSpPr>
+        <a:xfrm>
+          <a:off x="0" y="0"/>
+          <a:ext cx="0" cy="0"/>
+          <a:chOff x="0" y="0"/>
+          <a:chExt cx="0" cy="0"/>
+        </a:xfrm>
+      </p:grpSpPr>
+      <p:sp>
+        <p:nvSpPr>
+          <p:cNvPr id="2" name="Title 1">
+            <a:extLst>
+              <a:ext uri="{FF2B5EF4-FFF2-40B4-BE49-F238E27FC236}">
+                <a16:creationId xmlns:a16="http://schemas.microsoft.com/office/drawing/2014/main" id="{F1CFC9D5-2410-77D7-B797-57AC0CDE0140}"/>
+              </a:ext>
+            </a:extLst>
+          </p:cNvPr>
+          <p:cNvSpPr>
+            <a:spLocks noGrp="1"/>
+          </p:cNvSpPr>
+          <p:nvPr>
+            <p:ph type="title"/>
+          </p:nvPr>
+        </p:nvSpPr>
+        <p:spPr>
+          <a:xfrm>
+            <a:off x="472273" y="-251209"/>
+            <a:ext cx="10881527" cy="1941897"/>
+          </a:xfrm>
+        </p:spPr>
+        <p:txBody>
+          <a:bodyPr/>
+          <a:lstStyle/>
+          <a:p>
+            <a:r>
+              <a:rPr lang="en-IN" dirty="0"/>
+              <a:t>JIRA Timeline Dashboard </a:t>
+            </a:r>
+          </a:p>
+        </p:txBody>
+      </p:sp>
+      <p:pic>
+        <p:nvPicPr>
+          <p:cNvPr id="4" name="Picture 3">
+            <a:extLst>
+              <a:ext uri="{FF2B5EF4-FFF2-40B4-BE49-F238E27FC236}">
+                <a16:creationId xmlns:a16="http://schemas.microsoft.com/office/drawing/2014/main" id="{C6F08B93-9BEC-8F08-846F-6C0CCCBAD720}"/>
+              </a:ext>
+            </a:extLst>
+          </p:cNvPr>
+          <p:cNvPicPr>
+            <a:picLocks noChangeAspect="1"/>
+          </p:cNvPicPr>
+          <p:nvPr/>
+        </p:nvPicPr>
+        <p:blipFill>
+          <a:blip r:embed="rId2"/>
+          <a:stretch>
+            <a:fillRect/>
+          </a:stretch>
+        </p:blipFill>
+        <p:spPr>
+          <a:xfrm>
+            <a:off x="472273" y="1163347"/>
+            <a:ext cx="11353800" cy="5614386"/>
+          </a:xfrm>
+          <a:prstGeom prst="rect">
+            <a:avLst/>
+          </a:prstGeom>
+        </p:spPr>
+      </p:pic>
+    </p:spTree>
+    <p:extLst>
+      <p:ext uri="{BB962C8B-B14F-4D97-AF65-F5344CB8AC3E}">
+        <p14:creationId xmlns:p14="http://schemas.microsoft.com/office/powerpoint/2010/main" val="2065614301"/>
+      </p:ext>
+    </p:extLst>
+  </p:cSld>
+  <p:clrMapOvr>
+    <a:masterClrMapping/>
+  </p:clrMapOvr>
+</p:sld>
+</file>
+
+<file path=ppt/slides/slide14.xml><?xml version="1.0" encoding="utf-8"?>
+<p:sld xmlns:a="http://schemas.openxmlformats.org/drawingml/2006/main" xmlns:r="http://schemas.openxmlformats.org/officeDocument/2006/relationships" xmlns:p="http://schemas.openxmlformats.org/presentationml/2006/main">
+  <p:cSld>
+    <p:spTree>
+      <p:nvGrpSpPr>
+        <p:cNvPr id="1" name="">
+          <a:extLst>
+            <a:ext uri="{FF2B5EF4-FFF2-40B4-BE49-F238E27FC236}">
               <a16:creationId xmlns:a16="http://schemas.microsoft.com/office/drawing/2014/main" id="{8653CAE9-DE5F-E3E1-F786-D57CAB73CDF5}"/>
             </a:ext>
           </a:extLst>
@@ -3932,7 +4033,7 @@
 </p:sld>
 </file>
 
-<file path=ppt/slides/slide14.xml><?xml version="1.0" encoding="utf-8"?>
+<file path=ppt/slides/slide15.xml><?xml version="1.0" encoding="utf-8"?>
 <p:sld xmlns:a="http://schemas.openxmlformats.org/drawingml/2006/main" xmlns:r="http://schemas.openxmlformats.org/officeDocument/2006/relationships" xmlns:p="http://schemas.openxmlformats.org/presentationml/2006/main">
   <p:cSld>
     <p:spTree>

</xml_diff>